<commit_message>
Update Index and Lecture 10
</commit_message>
<xml_diff>
--- a/Lecture/Lecture 10/Lecture 10.pptx
+++ b/Lecture/Lecture 10/Lecture 10.pptx
@@ -18,17 +18,17 @@
     <p:sldId id="347" r:id="rId6"/>
     <p:sldId id="345" r:id="rId7"/>
     <p:sldId id="349" r:id="rId8"/>
-    <p:sldId id="350" r:id="rId9"/>
-    <p:sldId id="344" r:id="rId10"/>
-    <p:sldId id="351" r:id="rId11"/>
-    <p:sldId id="352" r:id="rId12"/>
-    <p:sldId id="340" r:id="rId13"/>
-    <p:sldId id="353" r:id="rId14"/>
-    <p:sldId id="341" r:id="rId15"/>
-    <p:sldId id="354" r:id="rId16"/>
-    <p:sldId id="355" r:id="rId17"/>
-    <p:sldId id="342" r:id="rId18"/>
-    <p:sldId id="343" r:id="rId19"/>
+    <p:sldId id="344" r:id="rId9"/>
+    <p:sldId id="351" r:id="rId10"/>
+    <p:sldId id="352" r:id="rId11"/>
+    <p:sldId id="340" r:id="rId12"/>
+    <p:sldId id="353" r:id="rId13"/>
+    <p:sldId id="341" r:id="rId14"/>
+    <p:sldId id="354" r:id="rId15"/>
+    <p:sldId id="355" r:id="rId16"/>
+    <p:sldId id="356" r:id="rId17"/>
+    <p:sldId id="357" r:id="rId18"/>
+    <p:sldId id="358" r:id="rId19"/>
     <p:sldId id="329" r:id="rId20"/>
   </p:sldIdLst>
   <p:sldSz cx="9144000" cy="6858000" type="screen4x3"/>
@@ -305,7 +305,7 @@
               <a:pPr>
                 <a:defRPr/>
               </a:pPr>
-              <a:t>9/16/2018</a:t>
+              <a:t>9/17/2018</a:t>
             </a:fld>
             <a:endParaRPr lang="en-US" dirty="0"/>
           </a:p>
@@ -517,7 +517,7 @@
               <a:pPr>
                 <a:defRPr/>
               </a:pPr>
-              <a:t>9/16/2018</a:t>
+              <a:t>9/17/2018</a:t>
             </a:fld>
             <a:endParaRPr lang="en-US" dirty="0"/>
           </a:p>
@@ -1036,7 +1036,7 @@
               <a:pPr>
                 <a:defRPr/>
               </a:pPr>
-              <a:t>9/16/2018</a:t>
+              <a:t>9/17/2018</a:t>
             </a:fld>
             <a:endParaRPr lang="en-US" dirty="0"/>
           </a:p>
@@ -1226,7 +1226,7 @@
               <a:pPr>
                 <a:defRPr/>
               </a:pPr>
-              <a:t>9/16/2018</a:t>
+              <a:t>9/17/2018</a:t>
             </a:fld>
             <a:endParaRPr lang="en-US" dirty="0"/>
           </a:p>
@@ -1426,7 +1426,7 @@
               <a:pPr>
                 <a:defRPr/>
               </a:pPr>
-              <a:t>9/16/2018</a:t>
+              <a:t>9/17/2018</a:t>
             </a:fld>
             <a:endParaRPr lang="en-US" dirty="0"/>
           </a:p>
@@ -1694,7 +1694,7 @@
               <a:pPr>
                 <a:defRPr/>
               </a:pPr>
-              <a:t>9/16/2018</a:t>
+              <a:t>9/17/2018</a:t>
             </a:fld>
             <a:endParaRPr lang="en-US" dirty="0">
               <a:solidFill>
@@ -1908,7 +1908,7 @@
               <a:pPr>
                 <a:defRPr/>
               </a:pPr>
-              <a:t>9/16/2018</a:t>
+              <a:t>9/17/2018</a:t>
             </a:fld>
             <a:endParaRPr lang="en-US" dirty="0">
               <a:solidFill>
@@ -2199,7 +2199,7 @@
               <a:pPr>
                 <a:defRPr/>
               </a:pPr>
-              <a:t>9/16/2018</a:t>
+              <a:t>9/17/2018</a:t>
             </a:fld>
             <a:endParaRPr lang="en-US" dirty="0">
               <a:solidFill>
@@ -2530,7 +2530,7 @@
               <a:pPr>
                 <a:defRPr/>
               </a:pPr>
-              <a:t>9/16/2018</a:t>
+              <a:t>9/17/2018</a:t>
             </a:fld>
             <a:endParaRPr lang="en-US" dirty="0">
               <a:solidFill>
@@ -2995,7 +2995,7 @@
               <a:pPr>
                 <a:defRPr/>
               </a:pPr>
-              <a:t>9/16/2018</a:t>
+              <a:t>9/17/2018</a:t>
             </a:fld>
             <a:endParaRPr lang="en-US" dirty="0">
               <a:solidFill>
@@ -3158,7 +3158,7 @@
               <a:pPr>
                 <a:defRPr/>
               </a:pPr>
-              <a:t>9/16/2018</a:t>
+              <a:t>9/17/2018</a:t>
             </a:fld>
             <a:endParaRPr lang="en-US" dirty="0">
               <a:solidFill>
@@ -3299,7 +3299,7 @@
               <a:pPr>
                 <a:defRPr/>
               </a:pPr>
-              <a:t>9/16/2018</a:t>
+              <a:t>9/17/2018</a:t>
             </a:fld>
             <a:endParaRPr lang="en-US" dirty="0">
               <a:solidFill>
@@ -3620,7 +3620,7 @@
               <a:pPr>
                 <a:defRPr/>
               </a:pPr>
-              <a:t>9/16/2018</a:t>
+              <a:t>9/17/2018</a:t>
             </a:fld>
             <a:endParaRPr lang="en-US" dirty="0">
               <a:solidFill>
@@ -3828,7 +3828,7 @@
               <a:pPr>
                 <a:defRPr/>
               </a:pPr>
-              <a:t>9/16/2018</a:t>
+              <a:t>9/17/2018</a:t>
             </a:fld>
             <a:endParaRPr lang="en-US" dirty="0"/>
           </a:p>
@@ -4111,7 +4111,7 @@
               <a:pPr>
                 <a:defRPr/>
               </a:pPr>
-              <a:t>9/16/2018</a:t>
+              <a:t>9/17/2018</a:t>
             </a:fld>
             <a:endParaRPr lang="en-US" dirty="0">
               <a:solidFill>
@@ -4325,7 +4325,7 @@
               <a:pPr>
                 <a:defRPr/>
               </a:pPr>
-              <a:t>9/16/2018</a:t>
+              <a:t>9/17/2018</a:t>
             </a:fld>
             <a:endParaRPr lang="en-US" dirty="0">
               <a:solidFill>
@@ -4549,7 +4549,7 @@
               <a:pPr>
                 <a:defRPr/>
               </a:pPr>
-              <a:t>9/16/2018</a:t>
+              <a:t>9/17/2018</a:t>
             </a:fld>
             <a:endParaRPr lang="en-US" dirty="0">
               <a:solidFill>
@@ -4759,7 +4759,7 @@
               <a:pPr>
                 <a:defRPr/>
               </a:pPr>
-              <a:t>9/16/2018</a:t>
+              <a:t>9/17/2018</a:t>
             </a:fld>
             <a:endParaRPr lang="en-US" dirty="0">
               <a:solidFill>
@@ -5036,7 +5036,7 @@
               <a:pPr>
                 <a:defRPr/>
               </a:pPr>
-              <a:t>9/16/2018</a:t>
+              <a:t>9/17/2018</a:t>
             </a:fld>
             <a:endParaRPr lang="en-US" dirty="0"/>
           </a:p>
@@ -5343,7 +5343,7 @@
               <a:pPr>
                 <a:defRPr/>
               </a:pPr>
-              <a:t>9/16/2018</a:t>
+              <a:t>9/17/2018</a:t>
             </a:fld>
             <a:endParaRPr lang="en-US" dirty="0"/>
           </a:p>
@@ -5784,7 +5784,7 @@
               <a:pPr>
                 <a:defRPr/>
               </a:pPr>
-              <a:t>9/16/2018</a:t>
+              <a:t>9/17/2018</a:t>
             </a:fld>
             <a:endParaRPr lang="en-US" dirty="0"/>
           </a:p>
@@ -5923,7 +5923,7 @@
               <a:pPr>
                 <a:defRPr/>
               </a:pPr>
-              <a:t>9/16/2018</a:t>
+              <a:t>9/17/2018</a:t>
             </a:fld>
             <a:endParaRPr lang="en-US" dirty="0"/>
           </a:p>
@@ -6040,7 +6040,7 @@
               <a:pPr>
                 <a:defRPr/>
               </a:pPr>
-              <a:t>9/16/2018</a:t>
+              <a:t>9/17/2018</a:t>
             </a:fld>
             <a:endParaRPr lang="en-US" dirty="0"/>
           </a:p>
@@ -6337,7 +6337,7 @@
               <a:pPr>
                 <a:defRPr/>
               </a:pPr>
-              <a:t>9/16/2018</a:t>
+              <a:t>9/17/2018</a:t>
             </a:fld>
             <a:endParaRPr lang="en-US" dirty="0"/>
           </a:p>
@@ -6614,7 +6614,7 @@
               <a:pPr>
                 <a:defRPr/>
               </a:pPr>
-              <a:t>9/16/2018</a:t>
+              <a:t>9/17/2018</a:t>
             </a:fld>
             <a:endParaRPr lang="en-US" dirty="0"/>
           </a:p>
@@ -6871,7 +6871,7 @@
               <a:pPr>
                 <a:defRPr/>
               </a:pPr>
-              <a:t>9/16/2018</a:t>
+              <a:t>9/17/2018</a:t>
             </a:fld>
             <a:endParaRPr lang="en-US" dirty="0"/>
           </a:p>
@@ -7581,7 +7581,7 @@
               <a:pPr>
                 <a:defRPr/>
               </a:pPr>
-              <a:t>9/16/2018</a:t>
+              <a:t>9/17/2018</a:t>
             </a:fld>
             <a:endParaRPr lang="en-US" dirty="0">
               <a:solidFill>
@@ -8627,7 +8627,28 @@
                 <a:ea typeface="+mj-ea"/>
                 <a:cs typeface="+mj-cs"/>
               </a:rPr>
-              <a:t>Four Roles</a:t>
+              <a:t>Part 1</a:t>
+            </a:r>
+            <a:br>
+              <a:rPr lang="en-US" sz="2400" kern="1200" dirty="0">
+                <a:solidFill>
+                  <a:schemeClr val="bg1"/>
+                </a:solidFill>
+                <a:latin typeface="+mj-lt"/>
+                <a:ea typeface="+mj-ea"/>
+                <a:cs typeface="+mj-cs"/>
+              </a:rPr>
+            </a:br>
+            <a:r>
+              <a:rPr lang="en-US" sz="2400" kern="1200" dirty="0">
+                <a:solidFill>
+                  <a:schemeClr val="bg1"/>
+                </a:solidFill>
+                <a:latin typeface="+mj-lt"/>
+                <a:ea typeface="+mj-ea"/>
+                <a:cs typeface="+mj-cs"/>
+              </a:rPr>
+              <a:t>Project Proposal</a:t>
             </a:r>
           </a:p>
         </p:txBody>
@@ -8664,10 +8685,10 @@
       </p:pic>
       <p:sp>
         <p:nvSpPr>
-          <p:cNvPr id="5" name="TextBox 4">
+          <p:cNvPr id="17" name="TextBox 16">
             <a:extLst>
               <a:ext uri="{FF2B5EF4-FFF2-40B4-BE49-F238E27FC236}">
-                <a16:creationId xmlns:a16="http://schemas.microsoft.com/office/drawing/2014/main" id="{C9AF1C32-EC93-4FF7-9238-757F64E507DB}"/>
+                <a16:creationId xmlns:a16="http://schemas.microsoft.com/office/drawing/2014/main" id="{06B7DDB2-2AA3-445A-BD53-AFD43615C987}"/>
               </a:ext>
             </a:extLst>
           </p:cNvPr>
@@ -8677,7 +8698,7 @@
         <p:spPr>
           <a:xfrm>
             <a:off x="3962400" y="643467"/>
-            <a:ext cx="5029200" cy="3416320"/>
+            <a:ext cx="5029200" cy="6370975"/>
           </a:xfrm>
           <a:prstGeom prst="rect">
             <a:avLst/>
@@ -8700,7 +8721,7 @@
                   <a:srgbClr val="404040"/>
                 </a:solidFill>
               </a:rPr>
-              <a:t>Abbreviated Roles</a:t>
+              <a:t>Select Data From Online (CIOD)</a:t>
             </a:r>
           </a:p>
           <a:p>
@@ -8714,7 +8735,7 @@
                   <a:srgbClr val="404040"/>
                 </a:solidFill>
               </a:rPr>
-              <a:t>Creator (C)</a:t>
+              <a:t>Must Contain At Least 5 Variables (Non-Identifier)</a:t>
             </a:r>
           </a:p>
           <a:p>
@@ -8728,7 +8749,7 @@
                   <a:srgbClr val="404040"/>
                 </a:solidFill>
               </a:rPr>
-              <a:t>Interpreter (I)</a:t>
+              <a:t>May Be Divided Into Multiple Data Sets (Requires Joins)</a:t>
             </a:r>
           </a:p>
           <a:p>
@@ -8742,7 +8763,21 @@
                   <a:srgbClr val="404040"/>
                 </a:solidFill>
               </a:rPr>
-              <a:t>Orator (O)</a:t>
+              <a:t>At Least 2 Variables Must Be Categorical or You Must Have a Clear Idea on How You Will Treat Numerical Variables as Categorical</a:t>
+            </a:r>
+          </a:p>
+          <a:p>
+            <a:pPr marL="342900" indent="-342900">
+              <a:buFont typeface="Arial" panose="020B0604020202020204" pitchFamily="34" charset="0"/>
+              <a:buChar char="•"/>
+            </a:pPr>
+            <a:r>
+              <a:rPr lang="en-US" dirty="0">
+                <a:solidFill>
+                  <a:srgbClr val="404040"/>
+                </a:solidFill>
+              </a:rPr>
+              <a:t>2 Initial Questions From Each Member (CIOD)</a:t>
             </a:r>
           </a:p>
           <a:p>
@@ -8756,11 +8791,53 @@
                   <a:srgbClr val="404040"/>
                 </a:solidFill>
               </a:rPr>
-              <a:t>Deliverer (D)</a:t>
-            </a:r>
-          </a:p>
-          <a:p>
-            <a:pPr marL="342900" indent="-342900">
+              <a:t>Innovative Thought</a:t>
+            </a:r>
+          </a:p>
+          <a:p>
+            <a:pPr marL="800100" lvl="1" indent="-342900">
+              <a:buFont typeface="Arial" panose="020B0604020202020204" pitchFamily="34" charset="0"/>
+              <a:buChar char="•"/>
+            </a:pPr>
+            <a:r>
+              <a:rPr lang="en-US" dirty="0">
+                <a:solidFill>
+                  <a:srgbClr val="404040"/>
+                </a:solidFill>
+              </a:rPr>
+              <a:t>Non-Trivial (Not Obvious)</a:t>
+            </a:r>
+          </a:p>
+          <a:p>
+            <a:pPr marL="800100" lvl="1" indent="-342900">
+              <a:buFont typeface="Arial" panose="020B0604020202020204" pitchFamily="34" charset="0"/>
+              <a:buChar char="•"/>
+            </a:pPr>
+            <a:r>
+              <a:rPr lang="en-US" dirty="0">
+                <a:solidFill>
+                  <a:srgbClr val="404040"/>
+                </a:solidFill>
+              </a:rPr>
+              <a:t>Groups of 4 = 8 Questions</a:t>
+            </a:r>
+          </a:p>
+          <a:p>
+            <a:pPr marL="800100" lvl="1" indent="-342900">
+              <a:buFont typeface="Arial" panose="020B0604020202020204" pitchFamily="34" charset="0"/>
+              <a:buChar char="•"/>
+            </a:pPr>
+            <a:r>
+              <a:rPr lang="en-US" dirty="0">
+                <a:solidFill>
+                  <a:srgbClr val="404040"/>
+                </a:solidFill>
+              </a:rPr>
+              <a:t>Groups of 5 = 10 Questions</a:t>
+            </a:r>
+          </a:p>
+          <a:p>
+            <a:pPr marL="800100" lvl="1" indent="-342900">
               <a:buFont typeface="Arial" panose="020B0604020202020204" pitchFamily="34" charset="0"/>
               <a:buChar char="•"/>
             </a:pPr>
@@ -8769,20 +8846,6 @@
                 <a:srgbClr val="404040"/>
               </a:solidFill>
             </a:endParaRPr>
-          </a:p>
-          <a:p>
-            <a:pPr marL="342900" indent="-342900">
-              <a:buFont typeface="Arial" panose="020B0604020202020204" pitchFamily="34" charset="0"/>
-              <a:buChar char="•"/>
-            </a:pPr>
-            <a:r>
-              <a:rPr lang="en-US" dirty="0">
-                <a:solidFill>
-                  <a:srgbClr val="404040"/>
-                </a:solidFill>
-              </a:rPr>
-              <a:t>For Each Part, There Are Clearly Defined Expectations for Each of These 4 Roles</a:t>
-            </a:r>
           </a:p>
         </p:txBody>
       </p:sp>
@@ -8792,7 +8855,7 @@
     </p:custDataLst>
     <p:extLst>
       <p:ext uri="{BB962C8B-B14F-4D97-AF65-F5344CB8AC3E}">
-        <p14:creationId xmlns:p14="http://schemas.microsoft.com/office/powerpoint/2010/main" val="1362434127"/>
+        <p14:creationId xmlns:p14="http://schemas.microsoft.com/office/powerpoint/2010/main" val="229741462"/>
       </p:ext>
     </p:extLst>
   </p:cSld>
@@ -9058,7 +9121,21 @@
                   <a:srgbClr val="404040"/>
                 </a:solidFill>
               </a:rPr>
-              <a:t>Select Data From Online (CIOD)</a:t>
+              <a:t>Delegate Your Roles (CIOD)</a:t>
+            </a:r>
+          </a:p>
+          <a:p>
+            <a:pPr marL="342900" indent="-342900">
+              <a:buFont typeface="Arial" panose="020B0604020202020204" pitchFamily="34" charset="0"/>
+              <a:buChar char="•"/>
+            </a:pPr>
+            <a:r>
+              <a:rPr lang="en-US" dirty="0">
+                <a:solidFill>
+                  <a:srgbClr val="404040"/>
+                </a:solidFill>
+              </a:rPr>
+              <a:t>Communication of Proposal (C)</a:t>
             </a:r>
           </a:p>
           <a:p>
@@ -9072,7 +9149,7 @@
                   <a:srgbClr val="404040"/>
                 </a:solidFill>
               </a:rPr>
-              <a:t>Must Contain At Least 5 Variables</a:t>
+              <a:t>Set Up Meeting in Office Hours Prior to October 5 at 5PM (5 Minute Block)</a:t>
             </a:r>
           </a:p>
           <a:p>
@@ -9086,7 +9163,7 @@
                   <a:srgbClr val="404040"/>
                 </a:solidFill>
               </a:rPr>
-              <a:t>May Be Divided Into Multiple Data Sets (Requires Joins)</a:t>
+              <a:t>Be On Time With Computer</a:t>
             </a:r>
           </a:p>
           <a:p>
@@ -9100,21 +9177,7 @@
                   <a:srgbClr val="404040"/>
                 </a:solidFill>
               </a:rPr>
-              <a:t>At Least 2 Variables Must Be Categorical or You Must Have a Clear Idea on How You Will Treat Numerical Variables as Categorical</a:t>
-            </a:r>
-          </a:p>
-          <a:p>
-            <a:pPr marL="342900" indent="-342900">
-              <a:buFont typeface="Arial" panose="020B0604020202020204" pitchFamily="34" charset="0"/>
-              <a:buChar char="•"/>
-            </a:pPr>
-            <a:r>
-              <a:rPr lang="en-US" dirty="0">
-                <a:solidFill>
-                  <a:srgbClr val="404040"/>
-                </a:solidFill>
-              </a:rPr>
-              <a:t>2 Initial Questions From Each Member (CIOD)</a:t>
+              <a:t>Have Data Ready to Show</a:t>
             </a:r>
           </a:p>
           <a:p>
@@ -9128,11 +9191,11 @@
                   <a:srgbClr val="404040"/>
                 </a:solidFill>
               </a:rPr>
-              <a:t>Innovative Thought</a:t>
-            </a:r>
-          </a:p>
-          <a:p>
-            <a:pPr marL="800100" lvl="1" indent="-342900">
+              <a:t>Information on:</a:t>
+            </a:r>
+          </a:p>
+          <a:p>
+            <a:pPr marL="1257300" lvl="2" indent="-342900">
               <a:buFont typeface="Arial" panose="020B0604020202020204" pitchFamily="34" charset="0"/>
               <a:buChar char="•"/>
             </a:pPr>
@@ -9142,11 +9205,11 @@
                   <a:srgbClr val="404040"/>
                 </a:solidFill>
               </a:rPr>
-              <a:t>Non-Trivial (Not Obvious)</a:t>
-            </a:r>
-          </a:p>
-          <a:p>
-            <a:pPr marL="800100" lvl="1" indent="-342900">
+              <a:t>Data Source</a:t>
+            </a:r>
+          </a:p>
+          <a:p>
+            <a:pPr marL="1257300" lvl="2" indent="-342900">
               <a:buFont typeface="Arial" panose="020B0604020202020204" pitchFamily="34" charset="0"/>
               <a:buChar char="•"/>
             </a:pPr>
@@ -9156,11 +9219,11 @@
                   <a:srgbClr val="404040"/>
                 </a:solidFill>
               </a:rPr>
-              <a:t>Groups of 4 = 8 Questions</a:t>
-            </a:r>
-          </a:p>
-          <a:p>
-            <a:pPr marL="800100" lvl="1" indent="-342900">
+              <a:t>Variables Contained</a:t>
+            </a:r>
+          </a:p>
+          <a:p>
+            <a:pPr marL="1257300" lvl="2" indent="-342900">
               <a:buFont typeface="Arial" panose="020B0604020202020204" pitchFamily="34" charset="0"/>
               <a:buChar char="•"/>
             </a:pPr>
@@ -9170,7 +9233,35 @@
                   <a:srgbClr val="404040"/>
                 </a:solidFill>
               </a:rPr>
-              <a:t>Groups of 5 = 10 Questions</a:t>
+              <a:t>Types of Variables</a:t>
+            </a:r>
+          </a:p>
+          <a:p>
+            <a:pPr marL="1257300" lvl="2" indent="-342900">
+              <a:buFont typeface="Arial" panose="020B0604020202020204" pitchFamily="34" charset="0"/>
+              <a:buChar char="•"/>
+            </a:pPr>
+            <a:r>
+              <a:rPr lang="en-US" dirty="0">
+                <a:solidFill>
+                  <a:srgbClr val="404040"/>
+                </a:solidFill>
+              </a:rPr>
+              <a:t>Questions Your Group Will Investigate and Variables of Interest</a:t>
+            </a:r>
+          </a:p>
+          <a:p>
+            <a:pPr marL="1257300" lvl="2" indent="-342900">
+              <a:buFont typeface="Arial" panose="020B0604020202020204" pitchFamily="34" charset="0"/>
+              <a:buChar char="•"/>
+            </a:pPr>
+            <a:r>
+              <a:rPr lang="en-US" dirty="0">
+                <a:solidFill>
+                  <a:srgbClr val="404040"/>
+                </a:solidFill>
+              </a:rPr>
+              <a:t>What Roles Your Other Members Are Taking</a:t>
             </a:r>
           </a:p>
           <a:p>
@@ -9192,7 +9283,7 @@
     </p:custDataLst>
     <p:extLst>
       <p:ext uri="{BB962C8B-B14F-4D97-AF65-F5344CB8AC3E}">
-        <p14:creationId xmlns:p14="http://schemas.microsoft.com/office/powerpoint/2010/main" val="229741462"/>
+        <p14:creationId xmlns:p14="http://schemas.microsoft.com/office/powerpoint/2010/main" val="2451046507"/>
       </p:ext>
     </p:extLst>
   </p:cSld>
@@ -9364,7 +9455,7 @@
                 <a:ea typeface="+mj-ea"/>
                 <a:cs typeface="+mj-cs"/>
               </a:rPr>
-              <a:t>Part 1</a:t>
+              <a:t>Part 2</a:t>
             </a:r>
             <a:br>
               <a:rPr lang="en-US" sz="2400" kern="1200" dirty="0">
@@ -9385,7 +9476,7 @@
                 <a:ea typeface="+mj-ea"/>
                 <a:cs typeface="+mj-cs"/>
               </a:rPr>
-              <a:t>Project Proposal</a:t>
+              <a:t>Exploratory Data Analysis</a:t>
             </a:r>
           </a:p>
         </p:txBody>
@@ -9422,10 +9513,10 @@
       </p:pic>
       <p:sp>
         <p:nvSpPr>
-          <p:cNvPr id="17" name="TextBox 16">
+          <p:cNvPr id="6" name="TextBox 5">
             <a:extLst>
               <a:ext uri="{FF2B5EF4-FFF2-40B4-BE49-F238E27FC236}">
-                <a16:creationId xmlns:a16="http://schemas.microsoft.com/office/drawing/2014/main" id="{06B7DDB2-2AA3-445A-BD53-AFD43615C987}"/>
+                <a16:creationId xmlns:a16="http://schemas.microsoft.com/office/drawing/2014/main" id="{9BF1A4AB-D5D3-46D9-9B5D-F6EB9EE88791}"/>
               </a:ext>
             </a:extLst>
           </p:cNvPr>
@@ -9435,7 +9526,7 @@
         <p:spPr>
           <a:xfrm>
             <a:off x="3962400" y="643467"/>
-            <a:ext cx="5029200" cy="6370975"/>
+            <a:ext cx="5029200" cy="5632311"/>
           </a:xfrm>
           <a:prstGeom prst="rect">
             <a:avLst/>
@@ -9458,7 +9549,35 @@
                   <a:srgbClr val="404040"/>
                 </a:solidFill>
               </a:rPr>
-              <a:t>Delegate Your Roles (CIOD)</a:t>
+              <a:t>Investigate Initial Questions (CIOD)</a:t>
+            </a:r>
+          </a:p>
+          <a:p>
+            <a:pPr marL="800100" lvl="1" indent="-342900">
+              <a:buFont typeface="Arial" panose="020B0604020202020204" pitchFamily="34" charset="0"/>
+              <a:buChar char="•"/>
+            </a:pPr>
+            <a:r>
+              <a:rPr lang="en-US" dirty="0">
+                <a:solidFill>
+                  <a:srgbClr val="404040"/>
+                </a:solidFill>
+              </a:rPr>
+              <a:t>Divide All Initial Questions Evenly Among the Group</a:t>
+            </a:r>
+          </a:p>
+          <a:p>
+            <a:pPr marL="800100" lvl="1" indent="-342900">
+              <a:buFont typeface="Arial" panose="020B0604020202020204" pitchFamily="34" charset="0"/>
+              <a:buChar char="•"/>
+            </a:pPr>
+            <a:r>
+              <a:rPr lang="en-US" dirty="0">
+                <a:solidFill>
+                  <a:srgbClr val="404040"/>
+                </a:solidFill>
+              </a:rPr>
+              <a:t>Each Member Must Create 2 Tables or Figures that Investigate Answers to the Questions Posed</a:t>
             </a:r>
           </a:p>
           <a:p>
@@ -9472,7 +9591,7 @@
                   <a:srgbClr val="404040"/>
                 </a:solidFill>
               </a:rPr>
-              <a:t>Communication of Proposal (C)</a:t>
+              <a:t>Follow up Questions (CIOD)</a:t>
             </a:r>
           </a:p>
           <a:p>
@@ -9486,131 +9605,8 @@
                   <a:srgbClr val="404040"/>
                 </a:solidFill>
               </a:rPr>
-              <a:t>Set Up Meeting in Office Hours Prior to October 5 at 5PM (5 Minute Block)</a:t>
-            </a:r>
-          </a:p>
-          <a:p>
-            <a:pPr marL="800100" lvl="1" indent="-342900">
-              <a:buFont typeface="Arial" panose="020B0604020202020204" pitchFamily="34" charset="0"/>
-              <a:buChar char="•"/>
-            </a:pPr>
-            <a:r>
-              <a:rPr lang="en-US" dirty="0">
-                <a:solidFill>
-                  <a:srgbClr val="404040"/>
-                </a:solidFill>
-              </a:rPr>
-              <a:t>Be On Time With Computer</a:t>
-            </a:r>
-          </a:p>
-          <a:p>
-            <a:pPr marL="800100" lvl="1" indent="-342900">
-              <a:buFont typeface="Arial" panose="020B0604020202020204" pitchFamily="34" charset="0"/>
-              <a:buChar char="•"/>
-            </a:pPr>
-            <a:r>
-              <a:rPr lang="en-US" dirty="0">
-                <a:solidFill>
-                  <a:srgbClr val="404040"/>
-                </a:solidFill>
-              </a:rPr>
-              <a:t>Have Data Ready to Show</a:t>
-            </a:r>
-          </a:p>
-          <a:p>
-            <a:pPr marL="800100" lvl="1" indent="-342900">
-              <a:buFont typeface="Arial" panose="020B0604020202020204" pitchFamily="34" charset="0"/>
-              <a:buChar char="•"/>
-            </a:pPr>
-            <a:r>
-              <a:rPr lang="en-US" dirty="0">
-                <a:solidFill>
-                  <a:srgbClr val="404040"/>
-                </a:solidFill>
-              </a:rPr>
-              <a:t>Information on:</a:t>
-            </a:r>
-          </a:p>
-          <a:p>
-            <a:pPr marL="1257300" lvl="2" indent="-342900">
-              <a:buFont typeface="Arial" panose="020B0604020202020204" pitchFamily="34" charset="0"/>
-              <a:buChar char="•"/>
-            </a:pPr>
-            <a:r>
-              <a:rPr lang="en-US" dirty="0">
-                <a:solidFill>
-                  <a:srgbClr val="404040"/>
-                </a:solidFill>
-              </a:rPr>
-              <a:t>Data Source</a:t>
-            </a:r>
-          </a:p>
-          <a:p>
-            <a:pPr marL="1257300" lvl="2" indent="-342900">
-              <a:buFont typeface="Arial" panose="020B0604020202020204" pitchFamily="34" charset="0"/>
-              <a:buChar char="•"/>
-            </a:pPr>
-            <a:r>
-              <a:rPr lang="en-US" dirty="0">
-                <a:solidFill>
-                  <a:srgbClr val="404040"/>
-                </a:solidFill>
-              </a:rPr>
-              <a:t>Variables Contained</a:t>
-            </a:r>
-          </a:p>
-          <a:p>
-            <a:pPr marL="1257300" lvl="2" indent="-342900">
-              <a:buFont typeface="Arial" panose="020B0604020202020204" pitchFamily="34" charset="0"/>
-              <a:buChar char="•"/>
-            </a:pPr>
-            <a:r>
-              <a:rPr lang="en-US" dirty="0">
-                <a:solidFill>
-                  <a:srgbClr val="404040"/>
-                </a:solidFill>
-              </a:rPr>
-              <a:t>Types of Variables</a:t>
-            </a:r>
-          </a:p>
-          <a:p>
-            <a:pPr marL="1257300" lvl="2" indent="-342900">
-              <a:buFont typeface="Arial" panose="020B0604020202020204" pitchFamily="34" charset="0"/>
-              <a:buChar char="•"/>
-            </a:pPr>
-            <a:r>
-              <a:rPr lang="en-US" dirty="0">
-                <a:solidFill>
-                  <a:srgbClr val="404040"/>
-                </a:solidFill>
-              </a:rPr>
-              <a:t>Questions Your Group Will Investigate and Variables of Interest</a:t>
-            </a:r>
-          </a:p>
-          <a:p>
-            <a:pPr marL="1257300" lvl="2" indent="-342900">
-              <a:buFont typeface="Arial" panose="020B0604020202020204" pitchFamily="34" charset="0"/>
-              <a:buChar char="•"/>
-            </a:pPr>
-            <a:r>
-              <a:rPr lang="en-US" dirty="0">
-                <a:solidFill>
-                  <a:srgbClr val="404040"/>
-                </a:solidFill>
-              </a:rPr>
-              <a:t>What Roles Your Other Members Are Taking</a:t>
-            </a:r>
-          </a:p>
-          <a:p>
-            <a:pPr marL="800100" lvl="1" indent="-342900">
-              <a:buFont typeface="Arial" panose="020B0604020202020204" pitchFamily="34" charset="0"/>
-              <a:buChar char="•"/>
-            </a:pPr>
-            <a:endParaRPr lang="en-US" dirty="0">
-              <a:solidFill>
-                <a:srgbClr val="404040"/>
-              </a:solidFill>
-            </a:endParaRPr>
+              <a:t>As a Group Propose 4 Additional Questions You Want to Explore for Statistical Significance Based on What You Found in Pursuit of Answering Initial Questions</a:t>
+            </a:r>
           </a:p>
         </p:txBody>
       </p:sp>
@@ -9620,7 +9616,7 @@
     </p:custDataLst>
     <p:extLst>
       <p:ext uri="{BB962C8B-B14F-4D97-AF65-F5344CB8AC3E}">
-        <p14:creationId xmlns:p14="http://schemas.microsoft.com/office/powerpoint/2010/main" val="2451046507"/>
+        <p14:creationId xmlns:p14="http://schemas.microsoft.com/office/powerpoint/2010/main" val="2112983825"/>
       </p:ext>
     </p:extLst>
   </p:cSld>
@@ -9886,7 +9882,7 @@
                   <a:srgbClr val="404040"/>
                 </a:solidFill>
               </a:rPr>
-              <a:t>Investigate Initial Questions (CIOD)</a:t>
+              <a:t>Investigate Follow-Up Questions (CIOD)</a:t>
             </a:r>
           </a:p>
           <a:p>
@@ -9900,7 +9896,21 @@
                   <a:srgbClr val="404040"/>
                 </a:solidFill>
               </a:rPr>
-              <a:t>Divide All Initial Questions Evenly Among the Group</a:t>
+              <a:t>Display 2 Tables or Figures Illustrating Your Attempt to Answer 2 of the Four Follow-Up Questions</a:t>
+            </a:r>
+          </a:p>
+          <a:p>
+            <a:pPr marL="342900" indent="-342900">
+              <a:buFont typeface="Arial" panose="020B0604020202020204" pitchFamily="34" charset="0"/>
+              <a:buChar char="•"/>
+            </a:pPr>
+            <a:r>
+              <a:rPr lang="en-US" dirty="0">
+                <a:solidFill>
+                  <a:srgbClr val="404040"/>
+                </a:solidFill>
+              </a:rPr>
+              <a:t>Summarize Investigation (CIOD)</a:t>
             </a:r>
           </a:p>
           <a:p>
@@ -9914,21 +9924,23 @@
                   <a:srgbClr val="404040"/>
                 </a:solidFill>
               </a:rPr>
-              <a:t>Each Member Must Create 2 Tables or Figures that Investigate Answers to the Questions Posed</a:t>
-            </a:r>
-          </a:p>
-          <a:p>
-            <a:pPr marL="342900" indent="-342900">
-              <a:buFont typeface="Arial" panose="020B0604020202020204" pitchFamily="34" charset="0"/>
-              <a:buChar char="•"/>
-            </a:pPr>
+              <a:t>Follow </a:t>
+            </a:r>
+            <a:r>
+              <a:rPr lang="en-US" dirty="0" err="1">
+                <a:solidFill>
+                  <a:srgbClr val="404040"/>
+                </a:solidFill>
+              </a:rPr>
+              <a:t>Rmarkdown</a:t>
+            </a:r>
             <a:r>
               <a:rPr lang="en-US" dirty="0">
                 <a:solidFill>
                   <a:srgbClr val="404040"/>
                 </a:solidFill>
               </a:rPr>
-              <a:t>Follow up Questions (CIOD)</a:t>
+              <a:t> Template</a:t>
             </a:r>
           </a:p>
           <a:p>
@@ -9942,7 +9954,35 @@
                   <a:srgbClr val="404040"/>
                 </a:solidFill>
               </a:rPr>
-              <a:t>As a Group Propose 4 Additional Questions You Want to Explore for Statistical Significance Based on What You Found in Pursuit of Answering Initial Questions</a:t>
+              <a:t>Results From Initial Questions Should Be Divided According to Each Member</a:t>
+            </a:r>
+          </a:p>
+          <a:p>
+            <a:pPr marL="800100" lvl="1" indent="-342900">
+              <a:buFont typeface="Arial" panose="020B0604020202020204" pitchFamily="34" charset="0"/>
+              <a:buChar char="•"/>
+            </a:pPr>
+            <a:r>
+              <a:rPr lang="en-US" dirty="0">
+                <a:solidFill>
+                  <a:srgbClr val="404040"/>
+                </a:solidFill>
+              </a:rPr>
+              <a:t>Follow-Up Questions Should Be Proposed</a:t>
+            </a:r>
+          </a:p>
+          <a:p>
+            <a:pPr marL="800100" lvl="1" indent="-342900">
+              <a:buFont typeface="Arial" panose="020B0604020202020204" pitchFamily="34" charset="0"/>
+              <a:buChar char="•"/>
+            </a:pPr>
+            <a:r>
+              <a:rPr lang="en-US" dirty="0">
+                <a:solidFill>
+                  <a:srgbClr val="404040"/>
+                </a:solidFill>
+              </a:rPr>
+              <a:t>Results from Investigating Follow-Up Questions</a:t>
             </a:r>
           </a:p>
         </p:txBody>
@@ -9953,7 +9993,7 @@
     </p:custDataLst>
     <p:extLst>
       <p:ext uri="{BB962C8B-B14F-4D97-AF65-F5344CB8AC3E}">
-        <p14:creationId xmlns:p14="http://schemas.microsoft.com/office/powerpoint/2010/main" val="2112983825"/>
+        <p14:creationId xmlns:p14="http://schemas.microsoft.com/office/powerpoint/2010/main" val="3498953360"/>
       </p:ext>
     </p:extLst>
   </p:cSld>
@@ -10195,8 +10235,8 @@
         </p:nvSpPr>
         <p:spPr>
           <a:xfrm>
-            <a:off x="3962400" y="643467"/>
-            <a:ext cx="5029200" cy="5632311"/>
+            <a:off x="3882710" y="643467"/>
+            <a:ext cx="5257800" cy="5262979"/>
           </a:xfrm>
           <a:prstGeom prst="rect">
             <a:avLst/>
@@ -10219,7 +10259,7 @@
                   <a:srgbClr val="404040"/>
                 </a:solidFill>
               </a:rPr>
-              <a:t>Investigate Follow-Up Questions (CIOD)</a:t>
+              <a:t>Written Summary (CIOD)</a:t>
             </a:r>
           </a:p>
           <a:p>
@@ -10233,8 +10273,38 @@
                   <a:srgbClr val="404040"/>
                 </a:solidFill>
               </a:rPr>
-              <a:t>Display 2 Tables or Figures Illustrating Your Attempt to Answer 2 of the Four Follow-Up Questions</a:t>
-            </a:r>
+              <a:t>Paragraph 1: Describes what you learned from your investigation of the initial questions.</a:t>
+            </a:r>
+          </a:p>
+          <a:p>
+            <a:pPr lvl="2"/>
+            <a:endParaRPr lang="en-US" dirty="0">
+              <a:solidFill>
+                <a:srgbClr val="404040"/>
+              </a:solidFill>
+            </a:endParaRPr>
+          </a:p>
+          <a:p>
+            <a:pPr marL="800100" lvl="1" indent="-342900">
+              <a:buFont typeface="Arial" panose="020B0604020202020204" pitchFamily="34" charset="0"/>
+              <a:buChar char="•"/>
+            </a:pPr>
+            <a:r>
+              <a:rPr lang="en-US" dirty="0">
+                <a:solidFill>
+                  <a:srgbClr val="404040"/>
+                </a:solidFill>
+              </a:rPr>
+              <a:t>Paragraph 2: Describes what you learned from your investigation of the follow-up questions</a:t>
+            </a:r>
+          </a:p>
+          <a:p>
+            <a:pPr lvl="2"/>
+            <a:endParaRPr lang="en-US" dirty="0">
+              <a:solidFill>
+                <a:srgbClr val="404040"/>
+              </a:solidFill>
+            </a:endParaRPr>
           </a:p>
           <a:p>
             <a:pPr marL="342900" indent="-342900">
@@ -10242,84 +10312,20 @@
               <a:buChar char="•"/>
             </a:pPr>
             <a:r>
+              <a:rPr lang="en-US" dirty="0" err="1">
+                <a:solidFill>
+                  <a:srgbClr val="404040"/>
+                </a:solidFill>
+              </a:rPr>
+              <a:t>Rmarkdown</a:t>
+            </a:r>
+            <a:r>
               <a:rPr lang="en-US" dirty="0">
                 <a:solidFill>
                   <a:srgbClr val="404040"/>
                 </a:solidFill>
               </a:rPr>
-              <a:t>Summarize Investigation (CIOD)</a:t>
-            </a:r>
-          </a:p>
-          <a:p>
-            <a:pPr marL="800100" lvl="1" indent="-342900">
-              <a:buFont typeface="Arial" panose="020B0604020202020204" pitchFamily="34" charset="0"/>
-              <a:buChar char="•"/>
-            </a:pPr>
-            <a:r>
-              <a:rPr lang="en-US" dirty="0">
-                <a:solidFill>
-                  <a:srgbClr val="404040"/>
-                </a:solidFill>
-              </a:rPr>
-              <a:t>Follow </a:t>
-            </a:r>
-            <a:r>
-              <a:rPr lang="en-US" dirty="0" err="1">
-                <a:solidFill>
-                  <a:srgbClr val="404040"/>
-                </a:solidFill>
-              </a:rPr>
-              <a:t>Rmarkdown</a:t>
-            </a:r>
-            <a:r>
-              <a:rPr lang="en-US" dirty="0">
-                <a:solidFill>
-                  <a:srgbClr val="404040"/>
-                </a:solidFill>
-              </a:rPr>
-              <a:t> Template</a:t>
-            </a:r>
-          </a:p>
-          <a:p>
-            <a:pPr marL="800100" lvl="1" indent="-342900">
-              <a:buFont typeface="Arial" panose="020B0604020202020204" pitchFamily="34" charset="0"/>
-              <a:buChar char="•"/>
-            </a:pPr>
-            <a:r>
-              <a:rPr lang="en-US" dirty="0">
-                <a:solidFill>
-                  <a:srgbClr val="404040"/>
-                </a:solidFill>
-              </a:rPr>
-              <a:t>Results From Initial Questions Should Be Divided According to Each Member</a:t>
-            </a:r>
-          </a:p>
-          <a:p>
-            <a:pPr marL="800100" lvl="1" indent="-342900">
-              <a:buFont typeface="Arial" panose="020B0604020202020204" pitchFamily="34" charset="0"/>
-              <a:buChar char="•"/>
-            </a:pPr>
-            <a:r>
-              <a:rPr lang="en-US" dirty="0">
-                <a:solidFill>
-                  <a:srgbClr val="404040"/>
-                </a:solidFill>
-              </a:rPr>
-              <a:t>Follow-Up Questions Should Be Proposed</a:t>
-            </a:r>
-          </a:p>
-          <a:p>
-            <a:pPr marL="800100" lvl="1" indent="-342900">
-              <a:buFont typeface="Arial" panose="020B0604020202020204" pitchFamily="34" charset="0"/>
-              <a:buChar char="•"/>
-            </a:pPr>
-            <a:r>
-              <a:rPr lang="en-US" dirty="0">
-                <a:solidFill>
-                  <a:srgbClr val="404040"/>
-                </a:solidFill>
-              </a:rPr>
-              <a:t>Results from Investigating Follow-Up Questions</a:t>
+              <a:t> Template Should be Edited, Proofread, and Submitted in HTML via Sakai by Due Date. (I)</a:t>
             </a:r>
           </a:p>
         </p:txBody>
@@ -10330,7 +10336,7 @@
     </p:custDataLst>
     <p:extLst>
       <p:ext uri="{BB962C8B-B14F-4D97-AF65-F5344CB8AC3E}">
-        <p14:creationId xmlns:p14="http://schemas.microsoft.com/office/powerpoint/2010/main" val="3498953360"/>
+        <p14:creationId xmlns:p14="http://schemas.microsoft.com/office/powerpoint/2010/main" val="2248181783"/>
       </p:ext>
     </p:extLst>
   </p:cSld>
@@ -10494,37 +10500,23 @@
               </a:lnSpc>
             </a:pPr>
             <a:r>
-              <a:rPr lang="en-US" sz="2400" kern="1200" dirty="0">
+              <a:rPr lang="en-US" sz="2400" dirty="0">
                 <a:solidFill>
                   <a:schemeClr val="bg1"/>
                 </a:solidFill>
-                <a:latin typeface="+mj-lt"/>
                 <a:ea typeface="+mj-ea"/>
                 <a:cs typeface="+mj-cs"/>
               </a:rPr>
-              <a:t>Part 2</a:t>
-            </a:r>
-            <a:br>
-              <a:rPr lang="en-US" sz="2400" kern="1200" dirty="0">
-                <a:solidFill>
-                  <a:schemeClr val="bg1"/>
-                </a:solidFill>
-                <a:latin typeface="+mj-lt"/>
-                <a:ea typeface="+mj-ea"/>
-                <a:cs typeface="+mj-cs"/>
-              </a:rPr>
-            </a:br>
-            <a:r>
-              <a:rPr lang="en-US" sz="2400" kern="1200" dirty="0">
-                <a:solidFill>
-                  <a:schemeClr val="bg1"/>
-                </a:solidFill>
-                <a:latin typeface="+mj-lt"/>
-                <a:ea typeface="+mj-ea"/>
-                <a:cs typeface="+mj-cs"/>
-              </a:rPr>
-              <a:t>Exploratory Data Analysis</a:t>
-            </a:r>
+              <a:t>Helpful Advice</a:t>
+            </a:r>
+            <a:endParaRPr lang="en-US" sz="2400" kern="1200" dirty="0">
+              <a:solidFill>
+                <a:schemeClr val="bg1"/>
+              </a:solidFill>
+              <a:latin typeface="+mj-lt"/>
+              <a:ea typeface="+mj-ea"/>
+              <a:cs typeface="+mj-cs"/>
+            </a:endParaRPr>
           </a:p>
         </p:txBody>
       </p:sp>
@@ -10573,7 +10565,7 @@
         <p:spPr>
           <a:xfrm>
             <a:off x="3882710" y="643467"/>
-            <a:ext cx="5257800" cy="6001643"/>
+            <a:ext cx="5257800" cy="4154984"/>
           </a:xfrm>
           <a:prstGeom prst="rect">
             <a:avLst/>
@@ -10596,7 +10588,7 @@
                   <a:srgbClr val="404040"/>
                 </a:solidFill>
               </a:rPr>
-              <a:t>Summarize Investigation (CIOD)</a:t>
+              <a:t>Project Proposal</a:t>
             </a:r>
           </a:p>
           <a:p>
@@ -10610,11 +10602,11 @@
                   <a:srgbClr val="404040"/>
                 </a:solidFill>
               </a:rPr>
-              <a:t>Written Summary</a:t>
-            </a:r>
-          </a:p>
-          <a:p>
-            <a:pPr marL="1257300" lvl="2" indent="-342900">
+              <a:t>Choose Roles Based Off Strengths and Availability</a:t>
+            </a:r>
+          </a:p>
+          <a:p>
+            <a:pPr marL="800100" lvl="1" indent="-342900">
               <a:buFont typeface="Arial" panose="020B0604020202020204" pitchFamily="34" charset="0"/>
               <a:buChar char="•"/>
             </a:pPr>
@@ -10624,11 +10616,11 @@
                   <a:srgbClr val="404040"/>
                 </a:solidFill>
               </a:rPr>
-              <a:t>Paragraph 1:</a:t>
-            </a:r>
-          </a:p>
-          <a:p>
-            <a:pPr marL="1714500" lvl="3" indent="-342900">
+              <a:t>Select a Dataset That is Interesting With Many Variables (&gt;10)</a:t>
+            </a:r>
+          </a:p>
+          <a:p>
+            <a:pPr marL="800100" lvl="1" indent="-342900">
               <a:buFont typeface="Arial" panose="020B0604020202020204" pitchFamily="34" charset="0"/>
               <a:buChar char="•"/>
             </a:pPr>
@@ -10638,11 +10630,11 @@
                   <a:srgbClr val="404040"/>
                 </a:solidFill>
               </a:rPr>
-              <a:t>What You Learned About Your Data?</a:t>
-            </a:r>
-          </a:p>
-          <a:p>
-            <a:pPr marL="1714500" lvl="3" indent="-342900">
+              <a:t>Pick Very General Initial Questions</a:t>
+            </a:r>
+          </a:p>
+          <a:p>
+            <a:pPr marL="800100" lvl="1" indent="-342900">
               <a:buFont typeface="Arial" panose="020B0604020202020204" pitchFamily="34" charset="0"/>
               <a:buChar char="•"/>
             </a:pPr>
@@ -10652,77 +10644,7 @@
                   <a:srgbClr val="404040"/>
                 </a:solidFill>
               </a:rPr>
-              <a:t>Which Initial Questions Led to More Questions?</a:t>
-            </a:r>
-          </a:p>
-          <a:p>
-            <a:pPr marL="1714500" lvl="3" indent="-342900">
-              <a:buFont typeface="Arial" panose="020B0604020202020204" pitchFamily="34" charset="0"/>
-              <a:buChar char="•"/>
-            </a:pPr>
-            <a:r>
-              <a:rPr lang="en-US" dirty="0">
-                <a:solidFill>
-                  <a:srgbClr val="404040"/>
-                </a:solidFill>
-              </a:rPr>
-              <a:t>Did Anything Surprise You?</a:t>
-            </a:r>
-          </a:p>
-          <a:p>
-            <a:pPr marL="1257300" lvl="2" indent="-342900">
-              <a:buFont typeface="Arial" panose="020B0604020202020204" pitchFamily="34" charset="0"/>
-              <a:buChar char="•"/>
-            </a:pPr>
-            <a:r>
-              <a:rPr lang="en-US" dirty="0">
-                <a:solidFill>
-                  <a:srgbClr val="404040"/>
-                </a:solidFill>
-              </a:rPr>
-              <a:t>Paragraph 2:</a:t>
-            </a:r>
-          </a:p>
-          <a:p>
-            <a:pPr marL="1714500" lvl="3" indent="-342900">
-              <a:buFont typeface="Arial" panose="020B0604020202020204" pitchFamily="34" charset="0"/>
-              <a:buChar char="•"/>
-            </a:pPr>
-            <a:r>
-              <a:rPr lang="en-US" dirty="0">
-                <a:solidFill>
-                  <a:srgbClr val="404040"/>
-                </a:solidFill>
-              </a:rPr>
-              <a:t>What New Questions Arose?</a:t>
-            </a:r>
-          </a:p>
-          <a:p>
-            <a:pPr marL="1714500" lvl="3" indent="-342900">
-              <a:buFont typeface="Arial" panose="020B0604020202020204" pitchFamily="34" charset="0"/>
-              <a:buChar char="•"/>
-            </a:pPr>
-            <a:r>
-              <a:rPr lang="en-US" dirty="0">
-                <a:solidFill>
-                  <a:srgbClr val="404040"/>
-                </a:solidFill>
-              </a:rPr>
-              <a:t>Which Follow-up Question Did You Begin to Analyze?</a:t>
-            </a:r>
-          </a:p>
-          <a:p>
-            <a:pPr marL="1714500" lvl="3" indent="-342900">
-              <a:buFont typeface="Arial" panose="020B0604020202020204" pitchFamily="34" charset="0"/>
-              <a:buChar char="•"/>
-            </a:pPr>
-            <a:r>
-              <a:rPr lang="en-US" dirty="0">
-                <a:solidFill>
-                  <a:srgbClr val="404040"/>
-                </a:solidFill>
-              </a:rPr>
-              <a:t>What Did You Discover?</a:t>
+              <a:t>Work as a Team to  Come Up With All Initial Questions Then Split Them Up as a Group</a:t>
             </a:r>
           </a:p>
         </p:txBody>
@@ -10733,7 +10655,7 @@
     </p:custDataLst>
     <p:extLst>
       <p:ext uri="{BB962C8B-B14F-4D97-AF65-F5344CB8AC3E}">
-        <p14:creationId xmlns:p14="http://schemas.microsoft.com/office/powerpoint/2010/main" val="2248181783"/>
+        <p14:creationId xmlns:p14="http://schemas.microsoft.com/office/powerpoint/2010/main" val="4002483088"/>
       </p:ext>
     </p:extLst>
   </p:cSld>
@@ -10897,37 +10819,23 @@
               </a:lnSpc>
             </a:pPr>
             <a:r>
-              <a:rPr lang="en-US" sz="2400" kern="1200" dirty="0">
+              <a:rPr lang="en-US" sz="2400" dirty="0">
                 <a:solidFill>
                   <a:schemeClr val="bg1"/>
                 </a:solidFill>
-                <a:latin typeface="+mj-lt"/>
                 <a:ea typeface="+mj-ea"/>
                 <a:cs typeface="+mj-cs"/>
               </a:rPr>
-              <a:t>Part 3</a:t>
-            </a:r>
-            <a:br>
-              <a:rPr lang="en-US" sz="2400" kern="1200" dirty="0">
-                <a:solidFill>
-                  <a:schemeClr val="bg1"/>
-                </a:solidFill>
-                <a:latin typeface="+mj-lt"/>
-                <a:ea typeface="+mj-ea"/>
-                <a:cs typeface="+mj-cs"/>
-              </a:rPr>
-            </a:br>
-            <a:r>
-              <a:rPr lang="en-US" sz="2400" kern="1200" dirty="0">
-                <a:solidFill>
-                  <a:schemeClr val="bg1"/>
-                </a:solidFill>
-                <a:latin typeface="+mj-lt"/>
-                <a:ea typeface="+mj-ea"/>
-                <a:cs typeface="+mj-cs"/>
-              </a:rPr>
-              <a:t>Final Presentation</a:t>
-            </a:r>
+              <a:t>Helpful Advice</a:t>
+            </a:r>
+            <a:endParaRPr lang="en-US" sz="2400" kern="1200" dirty="0">
+              <a:solidFill>
+                <a:schemeClr val="bg1"/>
+              </a:solidFill>
+              <a:latin typeface="+mj-lt"/>
+              <a:ea typeface="+mj-ea"/>
+              <a:cs typeface="+mj-cs"/>
+            </a:endParaRPr>
           </a:p>
         </p:txBody>
       </p:sp>
@@ -10961,13 +10869,126 @@
           <a:noFill/>
         </p:spPr>
       </p:pic>
+      <p:sp>
+        <p:nvSpPr>
+          <p:cNvPr id="6" name="TextBox 5">
+            <a:extLst>
+              <a:ext uri="{FF2B5EF4-FFF2-40B4-BE49-F238E27FC236}">
+                <a16:creationId xmlns:a16="http://schemas.microsoft.com/office/drawing/2014/main" id="{9BF1A4AB-D5D3-46D9-9B5D-F6EB9EE88791}"/>
+              </a:ext>
+            </a:extLst>
+          </p:cNvPr>
+          <p:cNvSpPr txBox="1"/>
+          <p:nvPr/>
+        </p:nvSpPr>
+        <p:spPr>
+          <a:xfrm>
+            <a:off x="3882710" y="643467"/>
+            <a:ext cx="5257800" cy="5262979"/>
+          </a:xfrm>
+          <a:prstGeom prst="rect">
+            <a:avLst/>
+          </a:prstGeom>
+          <a:noFill/>
+        </p:spPr>
+        <p:txBody>
+          <a:bodyPr wrap="square" rtlCol="0">
+            <a:spAutoFit/>
+          </a:bodyPr>
+          <a:lstStyle/>
+          <a:p>
+            <a:pPr marL="342900" indent="-342900">
+              <a:buFont typeface="Arial" panose="020B0604020202020204" pitchFamily="34" charset="0"/>
+              <a:buChar char="•"/>
+            </a:pPr>
+            <a:r>
+              <a:rPr lang="en-US" dirty="0">
+                <a:solidFill>
+                  <a:srgbClr val="404040"/>
+                </a:solidFill>
+              </a:rPr>
+              <a:t>Exploratory Data Analysis</a:t>
+            </a:r>
+          </a:p>
+          <a:p>
+            <a:pPr marL="800100" lvl="1" indent="-342900">
+              <a:buFont typeface="Arial" panose="020B0604020202020204" pitchFamily="34" charset="0"/>
+              <a:buChar char="•"/>
+            </a:pPr>
+            <a:r>
+              <a:rPr lang="en-US" dirty="0">
+                <a:solidFill>
+                  <a:srgbClr val="404040"/>
+                </a:solidFill>
+              </a:rPr>
+              <a:t>After Exploring Initial Questions Meet to Discuss Results</a:t>
+            </a:r>
+          </a:p>
+          <a:p>
+            <a:pPr marL="800100" lvl="1" indent="-342900">
+              <a:buFont typeface="Arial" panose="020B0604020202020204" pitchFamily="34" charset="0"/>
+              <a:buChar char="•"/>
+            </a:pPr>
+            <a:r>
+              <a:rPr lang="en-US" dirty="0">
+                <a:solidFill>
+                  <a:srgbClr val="404040"/>
+                </a:solidFill>
+              </a:rPr>
+              <a:t>Discuss Creatively in a Group Regarding Possible Follow-Up Questions</a:t>
+            </a:r>
+          </a:p>
+          <a:p>
+            <a:pPr marL="800100" lvl="1" indent="-342900">
+              <a:buFont typeface="Arial" panose="020B0604020202020204" pitchFamily="34" charset="0"/>
+              <a:buChar char="•"/>
+            </a:pPr>
+            <a:r>
+              <a:rPr lang="en-US" dirty="0">
+                <a:solidFill>
+                  <a:srgbClr val="404040"/>
+                </a:solidFill>
+              </a:rPr>
+              <a:t>Investigate the Follow-Up Questions as a Team</a:t>
+            </a:r>
+          </a:p>
+          <a:p>
+            <a:pPr marL="800100" lvl="1" indent="-342900">
+              <a:buFont typeface="Arial" panose="020B0604020202020204" pitchFamily="34" charset="0"/>
+              <a:buChar char="•"/>
+            </a:pPr>
+            <a:r>
+              <a:rPr lang="en-US" dirty="0">
+                <a:solidFill>
+                  <a:srgbClr val="404040"/>
+                </a:solidFill>
+              </a:rPr>
+              <a:t>Discuss the Information That Will Be Written About in the Summary</a:t>
+            </a:r>
+          </a:p>
+          <a:p>
+            <a:pPr marL="800100" lvl="1" indent="-342900">
+              <a:buFont typeface="Arial" panose="020B0604020202020204" pitchFamily="34" charset="0"/>
+              <a:buChar char="•"/>
+            </a:pPr>
+            <a:r>
+              <a:rPr lang="en-US" dirty="0">
+                <a:solidFill>
+                  <a:srgbClr val="404040"/>
+                </a:solidFill>
+              </a:rPr>
+              <a:t>The More Time You Take on This Part the Easier the Final Presentation and Paper Will Be</a:t>
+            </a:r>
+          </a:p>
+        </p:txBody>
+      </p:sp>
     </p:spTree>
     <p:custDataLst>
       <p:tags r:id="rId1"/>
     </p:custDataLst>
     <p:extLst>
       <p:ext uri="{BB962C8B-B14F-4D97-AF65-F5344CB8AC3E}">
-        <p14:creationId xmlns:p14="http://schemas.microsoft.com/office/powerpoint/2010/main" val="3924755614"/>
+        <p14:creationId xmlns:p14="http://schemas.microsoft.com/office/powerpoint/2010/main" val="1188712444"/>
       </p:ext>
     </p:extLst>
   </p:cSld>
@@ -11131,37 +11152,23 @@
               </a:lnSpc>
             </a:pPr>
             <a:r>
-              <a:rPr lang="en-US" sz="2400" kern="1200" dirty="0">
+              <a:rPr lang="en-US" sz="2400" dirty="0">
                 <a:solidFill>
                   <a:schemeClr val="bg1"/>
                 </a:solidFill>
-                <a:latin typeface="+mj-lt"/>
                 <a:ea typeface="+mj-ea"/>
                 <a:cs typeface="+mj-cs"/>
               </a:rPr>
-              <a:t>Part 4</a:t>
-            </a:r>
-            <a:br>
-              <a:rPr lang="en-US" sz="2400" kern="1200" dirty="0">
-                <a:solidFill>
-                  <a:schemeClr val="bg1"/>
-                </a:solidFill>
-                <a:latin typeface="+mj-lt"/>
-                <a:ea typeface="+mj-ea"/>
-                <a:cs typeface="+mj-cs"/>
-              </a:rPr>
-            </a:br>
-            <a:r>
-              <a:rPr lang="en-US" sz="2400" kern="1200" dirty="0">
-                <a:solidFill>
-                  <a:schemeClr val="bg1"/>
-                </a:solidFill>
-                <a:latin typeface="+mj-lt"/>
-                <a:ea typeface="+mj-ea"/>
-                <a:cs typeface="+mj-cs"/>
-              </a:rPr>
-              <a:t>Final Written Paper</a:t>
-            </a:r>
+              <a:t>Helpful Advice</a:t>
+            </a:r>
+            <a:endParaRPr lang="en-US" sz="2400" kern="1200" dirty="0">
+              <a:solidFill>
+                <a:schemeClr val="bg1"/>
+              </a:solidFill>
+              <a:latin typeface="+mj-lt"/>
+              <a:ea typeface="+mj-ea"/>
+              <a:cs typeface="+mj-cs"/>
+            </a:endParaRPr>
           </a:p>
         </p:txBody>
       </p:sp>
@@ -11195,13 +11202,126 @@
           <a:noFill/>
         </p:spPr>
       </p:pic>
+      <p:sp>
+        <p:nvSpPr>
+          <p:cNvPr id="6" name="TextBox 5">
+            <a:extLst>
+              <a:ext uri="{FF2B5EF4-FFF2-40B4-BE49-F238E27FC236}">
+                <a16:creationId xmlns:a16="http://schemas.microsoft.com/office/drawing/2014/main" id="{9BF1A4AB-D5D3-46D9-9B5D-F6EB9EE88791}"/>
+              </a:ext>
+            </a:extLst>
+          </p:cNvPr>
+          <p:cNvSpPr txBox="1"/>
+          <p:nvPr/>
+        </p:nvSpPr>
+        <p:spPr>
+          <a:xfrm>
+            <a:off x="3882710" y="643467"/>
+            <a:ext cx="5257800" cy="5632311"/>
+          </a:xfrm>
+          <a:prstGeom prst="rect">
+            <a:avLst/>
+          </a:prstGeom>
+          <a:noFill/>
+        </p:spPr>
+        <p:txBody>
+          <a:bodyPr wrap="square" rtlCol="0">
+            <a:spAutoFit/>
+          </a:bodyPr>
+          <a:lstStyle/>
+          <a:p>
+            <a:pPr marL="342900" indent="-342900">
+              <a:buFont typeface="Arial" panose="020B0604020202020204" pitchFamily="34" charset="0"/>
+              <a:buChar char="•"/>
+            </a:pPr>
+            <a:r>
+              <a:rPr lang="en-US" dirty="0">
+                <a:solidFill>
+                  <a:srgbClr val="404040"/>
+                </a:solidFill>
+              </a:rPr>
+              <a:t>General Advice</a:t>
+            </a:r>
+          </a:p>
+          <a:p>
+            <a:pPr marL="800100" lvl="1" indent="-342900">
+              <a:buFont typeface="Arial" panose="020B0604020202020204" pitchFamily="34" charset="0"/>
+              <a:buChar char="•"/>
+            </a:pPr>
+            <a:r>
+              <a:rPr lang="en-US" dirty="0">
+                <a:solidFill>
+                  <a:srgbClr val="404040"/>
+                </a:solidFill>
+              </a:rPr>
+              <a:t>Do Your Job and Hold Each Other Accountable</a:t>
+            </a:r>
+          </a:p>
+          <a:p>
+            <a:pPr marL="800100" lvl="1" indent="-342900">
+              <a:buFont typeface="Arial" panose="020B0604020202020204" pitchFamily="34" charset="0"/>
+              <a:buChar char="•"/>
+            </a:pPr>
+            <a:r>
+              <a:rPr lang="en-US" dirty="0">
+                <a:solidFill>
+                  <a:srgbClr val="404040"/>
+                </a:solidFill>
+              </a:rPr>
+              <a:t>When One Person Messes Up the Whole Team Loses Points</a:t>
+            </a:r>
+          </a:p>
+          <a:p>
+            <a:pPr marL="800100" lvl="1" indent="-342900">
+              <a:buFont typeface="Arial" panose="020B0604020202020204" pitchFamily="34" charset="0"/>
+              <a:buChar char="•"/>
+            </a:pPr>
+            <a:r>
+              <a:rPr lang="en-US" dirty="0">
+                <a:solidFill>
+                  <a:srgbClr val="404040"/>
+                </a:solidFill>
+              </a:rPr>
+              <a:t>Be Prepared to Evaluate Each Other at the End</a:t>
+            </a:r>
+          </a:p>
+          <a:p>
+            <a:pPr marL="800100" lvl="1" indent="-342900">
+              <a:buFont typeface="Arial" panose="020B0604020202020204" pitchFamily="34" charset="0"/>
+              <a:buChar char="•"/>
+            </a:pPr>
+            <a:r>
+              <a:rPr lang="en-US" dirty="0">
+                <a:solidFill>
+                  <a:srgbClr val="404040"/>
+                </a:solidFill>
+              </a:rPr>
+              <a:t>You Will Rank Every Member of Your Group on a 1-4 Scale from Least Helpful to Most Helpful</a:t>
+            </a:r>
+          </a:p>
+          <a:p>
+            <a:pPr marL="800100" lvl="1" indent="-342900">
+              <a:buFont typeface="Arial" panose="020B0604020202020204" pitchFamily="34" charset="0"/>
+              <a:buChar char="•"/>
+            </a:pPr>
+            <a:r>
+              <a:rPr lang="en-US" dirty="0">
+                <a:solidFill>
+                  <a:srgbClr val="404040"/>
+                </a:solidFill>
+              </a:rPr>
+              <a:t>Clear Descriptions and Rubrics Are Available on Website so Read Them To Ensure You Get All Points</a:t>
+            </a:r>
+          </a:p>
+        </p:txBody>
+      </p:sp>
     </p:spTree>
     <p:custDataLst>
       <p:tags r:id="rId1"/>
     </p:custDataLst>
     <p:extLst>
       <p:ext uri="{BB962C8B-B14F-4D97-AF65-F5344CB8AC3E}">
-        <p14:creationId xmlns:p14="http://schemas.microsoft.com/office/powerpoint/2010/main" val="2255877457"/>
+        <p14:creationId xmlns:p14="http://schemas.microsoft.com/office/powerpoint/2010/main" val="2280599603"/>
       </p:ext>
     </p:extLst>
   </p:cSld>
@@ -12928,7 +13048,7 @@
                   <a:srgbClr val="404040"/>
                 </a:solidFill>
               </a:rPr>
-              <a:t>Members of the Group Will Receive the Same Grade Except for 4 Points</a:t>
+              <a:t>Members of the Group Will Receive the Approximately the Same Grade</a:t>
             </a:r>
           </a:p>
           <a:p>
@@ -13635,7 +13755,7 @@
         <p:spPr>
           <a:xfrm>
             <a:off x="3962400" y="643467"/>
-            <a:ext cx="5029200" cy="6001643"/>
+            <a:ext cx="5029200" cy="4893647"/>
           </a:xfrm>
           <a:prstGeom prst="rect">
             <a:avLst/>
@@ -13672,7 +13792,7 @@
                   <a:srgbClr val="404040"/>
                 </a:solidFill>
               </a:rPr>
-              <a:t>Schedule a 10 Minute Meeting with Dr. Mario or Sir Thomas Keefe in Office Hours</a:t>
+              <a:t>Schedule a 5 Minute Meeting with Dr. Mario or Sir Thomas Keefe in Office Hours</a:t>
             </a:r>
           </a:p>
           <a:p>
@@ -13686,7 +13806,7 @@
                   <a:srgbClr val="404040"/>
                 </a:solidFill>
               </a:rPr>
-              <a:t>Discuss Your Group’s Findings According to the Initial Questions Proposed</a:t>
+              <a:t>Briefly Discuss Any Interesting Results that Came Out of the Initial Questions</a:t>
             </a:r>
           </a:p>
           <a:p>
@@ -13700,7 +13820,7 @@
                   <a:srgbClr val="404040"/>
                 </a:solidFill>
               </a:rPr>
-              <a:t>Discuss Your Group’s Findings on Any Additional Questions</a:t>
+              <a:t>Discuss Your Group’s Findings on The Follow-up Questions</a:t>
             </a:r>
           </a:p>
           <a:p>
@@ -13714,21 +13834,7 @@
                   <a:srgbClr val="404040"/>
                 </a:solidFill>
               </a:rPr>
-              <a:t>Explain Which Areas of Your Analysis Were Dead Ends</a:t>
-            </a:r>
-          </a:p>
-          <a:p>
-            <a:pPr marL="800100" lvl="1" indent="-342900">
-              <a:buFont typeface="Arial" panose="020B0604020202020204" pitchFamily="34" charset="0"/>
-              <a:buChar char="•"/>
-            </a:pPr>
-            <a:r>
-              <a:rPr lang="en-US" dirty="0">
-                <a:solidFill>
-                  <a:srgbClr val="404040"/>
-                </a:solidFill>
-              </a:rPr>
-              <a:t>Explain Which Areas Your Group Will Focus on For the Final Written Paper</a:t>
+              <a:t>Explain Which Areas Your Group Will Focus on For the Final Presentation and Paper</a:t>
             </a:r>
           </a:p>
         </p:txBody>
@@ -13951,7 +14057,7 @@
           <p:cNvPr id="5" name="TextBox 4">
             <a:extLst>
               <a:ext uri="{FF2B5EF4-FFF2-40B4-BE49-F238E27FC236}">
-                <a16:creationId xmlns:a16="http://schemas.microsoft.com/office/drawing/2014/main" id="{FE04CEFE-5E03-467B-BCE1-B06B7876906D}"/>
+                <a16:creationId xmlns:a16="http://schemas.microsoft.com/office/drawing/2014/main" id="{C9AF1C32-EC93-4FF7-9238-757F64E507DB}"/>
               </a:ext>
             </a:extLst>
           </p:cNvPr>
@@ -13961,7 +14067,7 @@
         <p:spPr>
           <a:xfrm>
             <a:off x="3962400" y="643467"/>
-            <a:ext cx="5029200" cy="6001643"/>
+            <a:ext cx="5029200" cy="6740307"/>
           </a:xfrm>
           <a:prstGeom prst="rect">
             <a:avLst/>
@@ -13984,7 +14090,7 @@
                   <a:srgbClr val="404040"/>
                 </a:solidFill>
               </a:rPr>
-              <a:t>Role 2: Interpreter</a:t>
+              <a:t>Role 3: Orator</a:t>
             </a:r>
           </a:p>
           <a:p>
@@ -13998,7 +14104,7 @@
                   <a:srgbClr val="404040"/>
                 </a:solidFill>
               </a:rPr>
-              <a:t>Schedule a 10 Minute Meeting with Dr. Mario or Sir Thomas Keefe in Office Hours</a:t>
+              <a:t>Deliver a 3-5 Minute Presentation on the Day of Final Exam</a:t>
             </a:r>
           </a:p>
           <a:p>
@@ -14012,7 +14118,7 @@
                   <a:srgbClr val="404040"/>
                 </a:solidFill>
               </a:rPr>
-              <a:t>Discuss Your Group’s Findings According to the Initial Questions Proposed</a:t>
+              <a:t>Use a Slide Show </a:t>
             </a:r>
           </a:p>
           <a:p>
@@ -14026,7 +14132,7 @@
                   <a:srgbClr val="404040"/>
                 </a:solidFill>
               </a:rPr>
-              <a:t>Discuss Your Group’s Findings on Any Additional Questions</a:t>
+              <a:t>Explain the Data You Used</a:t>
             </a:r>
           </a:p>
           <a:p>
@@ -14040,7 +14146,7 @@
                   <a:srgbClr val="404040"/>
                 </a:solidFill>
               </a:rPr>
-              <a:t>Explain Which Areas of Your Analysis Were Dead Ends</a:t>
+              <a:t>Show Visuals/ Tables to Illustrate Discoveries</a:t>
             </a:r>
           </a:p>
           <a:p>
@@ -14054,8 +14160,58 @@
                   <a:srgbClr val="404040"/>
                 </a:solidFill>
               </a:rPr>
-              <a:t>Explain Which Areas Your Group Will Focus on For the Final Written Paper</a:t>
-            </a:r>
+              <a:t>Discuss Details of Methods Used For Questions Your Group Pursued Deeper After the EDA</a:t>
+            </a:r>
+          </a:p>
+          <a:p>
+            <a:pPr marL="800100" lvl="1" indent="-342900">
+              <a:buFont typeface="Arial" panose="020B0604020202020204" pitchFamily="34" charset="0"/>
+              <a:buChar char="•"/>
+            </a:pPr>
+            <a:r>
+              <a:rPr lang="en-US" dirty="0">
+                <a:solidFill>
+                  <a:srgbClr val="404040"/>
+                </a:solidFill>
+              </a:rPr>
+              <a:t>Summarization of Written Paper</a:t>
+            </a:r>
+          </a:p>
+          <a:p>
+            <a:pPr marL="800100" lvl="1" indent="-342900">
+              <a:buFont typeface="Arial" panose="020B0604020202020204" pitchFamily="34" charset="0"/>
+              <a:buChar char="•"/>
+            </a:pPr>
+            <a:r>
+              <a:rPr lang="en-US" dirty="0">
+                <a:solidFill>
+                  <a:srgbClr val="404040"/>
+                </a:solidFill>
+              </a:rPr>
+              <a:t>Groups of 5 Will Have 2 Orators</a:t>
+            </a:r>
+          </a:p>
+          <a:p>
+            <a:pPr marL="800100" lvl="1" indent="-342900">
+              <a:buFont typeface="Arial" panose="020B0604020202020204" pitchFamily="34" charset="0"/>
+              <a:buChar char="•"/>
+            </a:pPr>
+            <a:endParaRPr lang="en-US" dirty="0">
+              <a:solidFill>
+                <a:srgbClr val="404040"/>
+              </a:solidFill>
+            </a:endParaRPr>
+          </a:p>
+          <a:p>
+            <a:pPr marL="800100" lvl="1" indent="-342900">
+              <a:buFont typeface="Arial" panose="020B0604020202020204" pitchFamily="34" charset="0"/>
+              <a:buChar char="•"/>
+            </a:pPr>
+            <a:endParaRPr lang="en-US" dirty="0">
+              <a:solidFill>
+                <a:srgbClr val="404040"/>
+              </a:solidFill>
+            </a:endParaRPr>
           </a:p>
         </p:txBody>
       </p:sp>
@@ -14065,7 +14221,7 @@
     </p:custDataLst>
     <p:extLst>
       <p:ext uri="{BB962C8B-B14F-4D97-AF65-F5344CB8AC3E}">
-        <p14:creationId xmlns:p14="http://schemas.microsoft.com/office/powerpoint/2010/main" val="1327769932"/>
+        <p14:creationId xmlns:p14="http://schemas.microsoft.com/office/powerpoint/2010/main" val="527376875"/>
       </p:ext>
     </p:extLst>
   </p:cSld>
@@ -14287,7 +14443,7 @@
         <p:spPr>
           <a:xfrm>
             <a:off x="3962400" y="643467"/>
-            <a:ext cx="5029200" cy="6370975"/>
+            <a:ext cx="5029200" cy="6001643"/>
           </a:xfrm>
           <a:prstGeom prst="rect">
             <a:avLst/>
@@ -14310,7 +14466,7 @@
                   <a:srgbClr val="404040"/>
                 </a:solidFill>
               </a:rPr>
-              <a:t>Role 3: Orator</a:t>
+              <a:t>Role 4: Deliverer</a:t>
             </a:r>
           </a:p>
           <a:p>
@@ -14324,7 +14480,23 @@
                   <a:srgbClr val="404040"/>
                 </a:solidFill>
               </a:rPr>
-              <a:t>Deliver a 3-5 Minute Presentation on the Day of Final Exam</a:t>
+              <a:t>Both the EDA and Final Written Paper Will Follow </a:t>
+            </a:r>
+            <a:r>
+              <a:rPr lang="en-US" dirty="0" err="1">
+                <a:solidFill>
+                  <a:srgbClr val="404040"/>
+                </a:solidFill>
+              </a:rPr>
+              <a:t>RMarkdown</a:t>
+            </a:r>
+            <a:r>
+              <a:rPr lang="en-US" dirty="0">
+                <a:solidFill>
+                  <a:srgbClr val="404040"/>
+                </a:solidFill>
+              </a:rPr>
+              <a:t> Templates</a:t>
             </a:r>
           </a:p>
           <a:p>
@@ -14338,7 +14510,7 @@
                   <a:srgbClr val="404040"/>
                 </a:solidFill>
               </a:rPr>
-              <a:t>Use a Slide Show Presentation</a:t>
+              <a:t>Ensure that These Parts are Organized According To Templates</a:t>
             </a:r>
           </a:p>
           <a:p>
@@ -14352,7 +14524,7 @@
                   <a:srgbClr val="404040"/>
                 </a:solidFill>
               </a:rPr>
-              <a:t>Explain the Data You Used</a:t>
+              <a:t>Ensure that These Parts are Free of Grammar and Spelling Errors</a:t>
             </a:r>
           </a:p>
           <a:p>
@@ -14366,7 +14538,7 @@
                   <a:srgbClr val="404040"/>
                 </a:solidFill>
               </a:rPr>
-              <a:t>Show Visuals/ Tables to Illustrate Discoveries</a:t>
+              <a:t>Ensure that These Parts are Clearly Explained and Hit All Requirements</a:t>
             </a:r>
           </a:p>
           <a:p>
@@ -14380,33 +14552,8 @@
                   <a:srgbClr val="404040"/>
                 </a:solidFill>
               </a:rPr>
-              <a:t>Discuss Details of Methods Used For Questions Your Group Pursued Deeper After the EDA</a:t>
-            </a:r>
-          </a:p>
-          <a:p>
-            <a:pPr marL="800100" lvl="1" indent="-342900">
-              <a:buFont typeface="Arial" panose="020B0604020202020204" pitchFamily="34" charset="0"/>
-              <a:buChar char="•"/>
-            </a:pPr>
-            <a:r>
-              <a:rPr lang="en-US" dirty="0">
-                <a:solidFill>
-                  <a:srgbClr val="404040"/>
-                </a:solidFill>
-              </a:rPr>
-              <a:t>Summarization of Written Paper</a:t>
-            </a:r>
-          </a:p>
-          <a:p>
-            <a:pPr marL="800100" lvl="1" indent="-342900">
-              <a:buFont typeface="Arial" panose="020B0604020202020204" pitchFamily="34" charset="0"/>
-              <a:buChar char="•"/>
-            </a:pPr>
-            <a:endParaRPr lang="en-US" dirty="0">
-              <a:solidFill>
-                <a:srgbClr val="404040"/>
-              </a:solidFill>
-            </a:endParaRPr>
+              <a:t>Submit Both Parts Before 5 PM on Due Dates in HTML</a:t>
+            </a:r>
           </a:p>
           <a:p>
             <a:pPr marL="800100" lvl="1" indent="-342900">
@@ -14427,7 +14574,7 @@
     </p:custDataLst>
     <p:extLst>
       <p:ext uri="{BB962C8B-B14F-4D97-AF65-F5344CB8AC3E}">
-        <p14:creationId xmlns:p14="http://schemas.microsoft.com/office/powerpoint/2010/main" val="527376875"/>
+        <p14:creationId xmlns:p14="http://schemas.microsoft.com/office/powerpoint/2010/main" val="4203455210"/>
       </p:ext>
     </p:extLst>
   </p:cSld>
@@ -14649,7 +14796,7 @@
         <p:spPr>
           <a:xfrm>
             <a:off x="3962400" y="643467"/>
-            <a:ext cx="5029200" cy="6001643"/>
+            <a:ext cx="5029200" cy="3416320"/>
           </a:xfrm>
           <a:prstGeom prst="rect">
             <a:avLst/>
@@ -14672,7 +14819,7 @@
                   <a:srgbClr val="404040"/>
                 </a:solidFill>
               </a:rPr>
-              <a:t>Role 4: Deliverer</a:t>
+              <a:t>Abbreviated Roles</a:t>
             </a:r>
           </a:p>
           <a:p>
@@ -14686,23 +14833,7 @@
                   <a:srgbClr val="404040"/>
                 </a:solidFill>
               </a:rPr>
-              <a:t>Both the EDA and Final Written Paper Will Follow </a:t>
-            </a:r>
-            <a:r>
-              <a:rPr lang="en-US" dirty="0" err="1">
-                <a:solidFill>
-                  <a:srgbClr val="404040"/>
-                </a:solidFill>
-              </a:rPr>
-              <a:t>RMarkdown</a:t>
-            </a:r>
-            <a:r>
-              <a:rPr lang="en-US" dirty="0">
-                <a:solidFill>
-                  <a:srgbClr val="404040"/>
-                </a:solidFill>
-              </a:rPr>
-              <a:t> Templates</a:t>
+              <a:t>Creator (C)</a:t>
             </a:r>
           </a:p>
           <a:p>
@@ -14716,7 +14847,7 @@
                   <a:srgbClr val="404040"/>
                 </a:solidFill>
               </a:rPr>
-              <a:t>Ensure that These Parts are Organized According To Templates</a:t>
+              <a:t>Interpreter (I)</a:t>
             </a:r>
           </a:p>
           <a:p>
@@ -14730,7 +14861,7 @@
                   <a:srgbClr val="404040"/>
                 </a:solidFill>
               </a:rPr>
-              <a:t>Ensure that These Parts are Free of Grammar and Spelling Errors</a:t>
+              <a:t>Orator (O)</a:t>
             </a:r>
           </a:p>
           <a:p>
@@ -14744,25 +14875,11 @@
                   <a:srgbClr val="404040"/>
                 </a:solidFill>
               </a:rPr>
-              <a:t>Ensure that These Parts are Clearly Explained and Hit All Requirements</a:t>
-            </a:r>
-          </a:p>
-          <a:p>
-            <a:pPr marL="800100" lvl="1" indent="-342900">
-              <a:buFont typeface="Arial" panose="020B0604020202020204" pitchFamily="34" charset="0"/>
-              <a:buChar char="•"/>
-            </a:pPr>
-            <a:r>
-              <a:rPr lang="en-US" dirty="0">
-                <a:solidFill>
-                  <a:srgbClr val="404040"/>
-                </a:solidFill>
-              </a:rPr>
-              <a:t>Submit Both Parts Before 5 PM on Due Dates</a:t>
-            </a:r>
-          </a:p>
-          <a:p>
-            <a:pPr marL="800100" lvl="1" indent="-342900">
+              <a:t>Deliverer (D)</a:t>
+            </a:r>
+          </a:p>
+          <a:p>
+            <a:pPr marL="342900" indent="-342900">
               <a:buFont typeface="Arial" panose="020B0604020202020204" pitchFamily="34" charset="0"/>
               <a:buChar char="•"/>
             </a:pPr>
@@ -14771,6 +14888,20 @@
                 <a:srgbClr val="404040"/>
               </a:solidFill>
             </a:endParaRPr>
+          </a:p>
+          <a:p>
+            <a:pPr marL="342900" indent="-342900">
+              <a:buFont typeface="Arial" panose="020B0604020202020204" pitchFamily="34" charset="0"/>
+              <a:buChar char="•"/>
+            </a:pPr>
+            <a:r>
+              <a:rPr lang="en-US" dirty="0">
+                <a:solidFill>
+                  <a:srgbClr val="404040"/>
+                </a:solidFill>
+              </a:rPr>
+              <a:t>For Each Part, There Are Clearly Defined Expectations for Each of These 4 Roles</a:t>
+            </a:r>
           </a:p>
         </p:txBody>
       </p:sp>
@@ -14780,7 +14911,7 @@
     </p:custDataLst>
     <p:extLst>
       <p:ext uri="{BB962C8B-B14F-4D97-AF65-F5344CB8AC3E}">
-        <p14:creationId xmlns:p14="http://schemas.microsoft.com/office/powerpoint/2010/main" val="4203455210"/>
+        <p14:creationId xmlns:p14="http://schemas.microsoft.com/office/powerpoint/2010/main" val="1362434127"/>
       </p:ext>
     </p:extLst>
   </p:cSld>

</xml_diff>